<commit_message>
Updated README and images
</commit_message>
<xml_diff>
--- a/images/bert_art.pptx
+++ b/images/bert_art.pptx
@@ -6429,19 +6429,7 @@
                 <a:cs typeface="Barlow"/>
                 <a:sym typeface="Barlow"/>
               </a:rPr>
-              <a:t>Efficient Multi-GPU Training with </a:t>
-            </a:r>
-            <a:r>
-              <a:rPr lang="en-GB" sz="1200" dirty="0" err="1">
-                <a:solidFill>
-                  <a:srgbClr val="434343"/>
-                </a:solidFill>
-                <a:latin typeface="DINPro" panose="02000503030000020004" pitchFamily="2" charset="0"/>
-                <a:ea typeface="Barlow"/>
-                <a:cs typeface="Barlow"/>
-                <a:sym typeface="Barlow"/>
-              </a:rPr>
-              <a:t>Horovod</a:t>
+              <a:t>Efficient Multi-GPU Training with Horovod</a:t>
             </a:r>
             <a:endParaRPr sz="1200" dirty="0">
               <a:latin typeface="DINPro" panose="02000503030000020004" pitchFamily="2" charset="0"/>
@@ -7092,16 +7080,25 @@
             <a:r>
               <a:rPr lang="en-GB" sz="1100" dirty="0">
                 <a:solidFill>
-                  <a:srgbClr val="434343"/>
+                  <a:schemeClr val="tx1">
+                    <a:lumMod val="65000"/>
+                    <a:lumOff val="35000"/>
+                  </a:schemeClr>
                 </a:solidFill>
                 <a:latin typeface="DINPro" panose="02000503030000020004" pitchFamily="2" charset="0"/>
                 <a:ea typeface="Barlow"/>
                 <a:cs typeface="Barlow"/>
                 <a:sym typeface="Barlow"/>
               </a:rPr>
-              <a:t>(training examples per second)</a:t>
+              <a:t>Training examples per second on DGX-1V (Max-Q mode)</a:t>
             </a:r>
             <a:endParaRPr sz="1100" dirty="0">
+              <a:solidFill>
+                <a:schemeClr val="tx1">
+                  <a:lumMod val="65000"/>
+                  <a:lumOff val="35000"/>
+                </a:schemeClr>
+              </a:solidFill>
               <a:latin typeface="DINPro" panose="02000503030000020004" pitchFamily="2" charset="0"/>
               <a:ea typeface="Barlow"/>
               <a:cs typeface="Barlow"/>

</xml_diff>